<commit_message>
Questions in section 2 documented
</commit_message>
<xml_diff>
--- a/documentation/streaming-system-overview.pptx
+++ b/documentation/streaming-system-overview.pptx
@@ -9,6 +9,8 @@
     <p:sldId id="257" r:id="rId3"/>
     <p:sldId id="258" r:id="rId4"/>
     <p:sldId id="259" r:id="rId5"/>
+    <p:sldId id="260" r:id="rId6"/>
+    <p:sldId id="261" r:id="rId7"/>
   </p:sldIdLst>
   <p:sldSz cx="12192000" cy="6858000"/>
   <p:notesSz cx="6858000" cy="9144000"/>
@@ -107,6 +109,11 @@
       </a:defRPr>
     </a:lvl9pPr>
   </p:defaultTextStyle>
+  <p:extLst>
+    <p:ext uri="{EFAFB233-063F-42B5-8137-9DF3F51BA10A}">
+      <p15:sldGuideLst xmlns:p15="http://schemas.microsoft.com/office/powerpoint/2012/main"/>
+    </p:ext>
+  </p:extLst>
 </p:presentation>
 </file>
 
@@ -5647,6 +5654,2013 @@
 </p:sld>
 </file>
 
+<file path=ppt/slides/slide5.xml><?xml version="1.0" encoding="utf-8"?>
+<p:sld xmlns:a="http://schemas.openxmlformats.org/drawingml/2006/main" xmlns:r="http://schemas.openxmlformats.org/officeDocument/2006/relationships" xmlns:p="http://schemas.openxmlformats.org/presentationml/2006/main">
+  <p:cSld>
+    <p:spTree>
+      <p:nvGrpSpPr>
+        <p:cNvPr id="1" name=""/>
+        <p:cNvGrpSpPr/>
+        <p:nvPr/>
+      </p:nvGrpSpPr>
+      <p:grpSpPr>
+        <a:xfrm>
+          <a:off x="0" y="0"/>
+          <a:ext cx="0" cy="0"/>
+          <a:chOff x="0" y="0"/>
+          <a:chExt cx="0" cy="0"/>
+        </a:xfrm>
+      </p:grpSpPr>
+      <p:sp>
+        <p:nvSpPr>
+          <p:cNvPr id="2" name="Can 1"/>
+          <p:cNvSpPr/>
+          <p:nvPr/>
+        </p:nvSpPr>
+        <p:spPr>
+          <a:xfrm rot="16200000">
+            <a:off x="1139228" y="603319"/>
+            <a:ext cx="436098" cy="1885071"/>
+          </a:xfrm>
+          <a:prstGeom prst="can">
+            <a:avLst/>
+          </a:prstGeom>
+        </p:spPr>
+        <p:style>
+          <a:lnRef idx="2">
+            <a:schemeClr val="accent1">
+              <a:shade val="50000"/>
+            </a:schemeClr>
+          </a:lnRef>
+          <a:fillRef idx="1">
+            <a:schemeClr val="accent1"/>
+          </a:fillRef>
+          <a:effectRef idx="0">
+            <a:schemeClr val="accent1"/>
+          </a:effectRef>
+          <a:fontRef idx="minor">
+            <a:schemeClr val="lt1"/>
+          </a:fontRef>
+        </p:style>
+        <p:txBody>
+          <a:bodyPr rtlCol="0" anchor="ctr"/>
+          <a:lstStyle/>
+          <a:p>
+            <a:pPr algn="ctr"/>
+            <a:endParaRPr lang="en-US" dirty="0"/>
+          </a:p>
+        </p:txBody>
+      </p:sp>
+      <p:sp>
+        <p:nvSpPr>
+          <p:cNvPr id="3" name="TextBox 2"/>
+          <p:cNvSpPr txBox="1"/>
+          <p:nvPr/>
+        </p:nvSpPr>
+        <p:spPr>
+          <a:xfrm>
+            <a:off x="1058651" y="1355954"/>
+            <a:ext cx="679994" cy="369332"/>
+          </a:xfrm>
+          <a:prstGeom prst="rect">
+            <a:avLst/>
+          </a:prstGeom>
+          <a:noFill/>
+        </p:spPr>
+        <p:txBody>
+          <a:bodyPr wrap="none" rtlCol="0">
+            <a:spAutoFit/>
+          </a:bodyPr>
+          <a:lstStyle/>
+          <a:p>
+            <a:r>
+              <a:rPr lang="en-US" dirty="0" smtClean="0"/>
+              <a:t>input</a:t>
+            </a:r>
+            <a:endParaRPr lang="en-US" dirty="0"/>
+          </a:p>
+        </p:txBody>
+      </p:sp>
+      <p:sp>
+        <p:nvSpPr>
+          <p:cNvPr id="6" name="Rectangle 5"/>
+          <p:cNvSpPr/>
+          <p:nvPr/>
+        </p:nvSpPr>
+        <p:spPr>
+          <a:xfrm>
+            <a:off x="4933444" y="1295662"/>
+            <a:ext cx="1943084" cy="464234"/>
+          </a:xfrm>
+          <a:prstGeom prst="rect">
+            <a:avLst/>
+          </a:prstGeom>
+        </p:spPr>
+        <p:style>
+          <a:lnRef idx="2">
+            <a:schemeClr val="accent4">
+              <a:shade val="50000"/>
+            </a:schemeClr>
+          </a:lnRef>
+          <a:fillRef idx="1">
+            <a:schemeClr val="accent4"/>
+          </a:fillRef>
+          <a:effectRef idx="0">
+            <a:schemeClr val="accent4"/>
+          </a:effectRef>
+          <a:fontRef idx="minor">
+            <a:schemeClr val="lt1"/>
+          </a:fontRef>
+        </p:style>
+        <p:txBody>
+          <a:bodyPr rtlCol="0" anchor="ctr"/>
+          <a:lstStyle/>
+          <a:p>
+            <a:pPr algn="ctr"/>
+            <a:r>
+              <a:rPr lang="es-ES" dirty="0" smtClean="0"/>
+              <a:t>ORD </a:t>
+            </a:r>
+            <a:r>
+              <a:rPr lang="es-ES" dirty="0" smtClean="0"/>
+              <a:t>RD -1.2</a:t>
+            </a:r>
+            <a:endParaRPr lang="en-US" dirty="0"/>
+          </a:p>
+        </p:txBody>
+      </p:sp>
+      <p:cxnSp>
+        <p:nvCxnSpPr>
+          <p:cNvPr id="16" name="Straight Arrow Connector 15"/>
+          <p:cNvCxnSpPr>
+            <a:stCxn id="2" idx="3"/>
+            <a:endCxn id="12" idx="1"/>
+          </p:cNvCxnSpPr>
+          <p:nvPr/>
+        </p:nvCxnSpPr>
+        <p:spPr>
+          <a:xfrm flipV="1">
+            <a:off x="2299813" y="1540620"/>
+            <a:ext cx="776939" cy="5234"/>
+          </a:xfrm>
+          <a:prstGeom prst="straightConnector1">
+            <a:avLst/>
+          </a:prstGeom>
+          <a:ln w="44450" cap="flat" cmpd="sng" algn="ctr">
+            <a:solidFill>
+              <a:schemeClr val="accent1"/>
+            </a:solidFill>
+            <a:prstDash val="dash"/>
+            <a:round/>
+            <a:headEnd type="none" w="med" len="med"/>
+            <a:tailEnd type="arrow" w="med" len="med"/>
+          </a:ln>
+        </p:spPr>
+        <p:style>
+          <a:lnRef idx="0">
+            <a:scrgbClr r="0" g="0" b="0"/>
+          </a:lnRef>
+          <a:fillRef idx="0">
+            <a:scrgbClr r="0" g="0" b="0"/>
+          </a:fillRef>
+          <a:effectRef idx="0">
+            <a:scrgbClr r="0" g="0" b="0"/>
+          </a:effectRef>
+          <a:fontRef idx="minor">
+            <a:schemeClr val="tx1"/>
+          </a:fontRef>
+        </p:style>
+      </p:cxnSp>
+      <p:cxnSp>
+        <p:nvCxnSpPr>
+          <p:cNvPr id="18" name="Straight Arrow Connector 17"/>
+          <p:cNvCxnSpPr>
+            <a:stCxn id="12" idx="3"/>
+            <a:endCxn id="6" idx="1"/>
+          </p:cNvCxnSpPr>
+          <p:nvPr/>
+        </p:nvCxnSpPr>
+        <p:spPr>
+          <a:xfrm flipV="1">
+            <a:off x="4153185" y="1527779"/>
+            <a:ext cx="780259" cy="12841"/>
+          </a:xfrm>
+          <a:prstGeom prst="straightConnector1">
+            <a:avLst/>
+          </a:prstGeom>
+          <a:ln w="44450" cap="flat" cmpd="sng" algn="ctr">
+            <a:solidFill>
+              <a:schemeClr val="accent1"/>
+            </a:solidFill>
+            <a:prstDash val="dash"/>
+            <a:round/>
+            <a:headEnd type="none" w="med" len="med"/>
+            <a:tailEnd type="arrow" w="med" len="med"/>
+          </a:ln>
+        </p:spPr>
+        <p:style>
+          <a:lnRef idx="0">
+            <a:scrgbClr r="0" g="0" b="0"/>
+          </a:lnRef>
+          <a:fillRef idx="0">
+            <a:scrgbClr r="0" g="0" b="0"/>
+          </a:fillRef>
+          <a:effectRef idx="0">
+            <a:scrgbClr r="0" g="0" b="0"/>
+          </a:effectRef>
+          <a:fontRef idx="minor">
+            <a:schemeClr val="tx1"/>
+          </a:fontRef>
+        </p:style>
+      </p:cxnSp>
+      <p:sp>
+        <p:nvSpPr>
+          <p:cNvPr id="12" name="Rounded Rectangle 11"/>
+          <p:cNvSpPr/>
+          <p:nvPr/>
+        </p:nvSpPr>
+        <p:spPr>
+          <a:xfrm>
+            <a:off x="3076752" y="1151766"/>
+            <a:ext cx="1076433" cy="777708"/>
+          </a:xfrm>
+          <a:prstGeom prst="roundRect">
+            <a:avLst/>
+          </a:prstGeom>
+          <a:noFill/>
+          <a:ln/>
+        </p:spPr>
+        <p:style>
+          <a:lnRef idx="2">
+            <a:schemeClr val="accent2"/>
+          </a:lnRef>
+          <a:fillRef idx="1">
+            <a:schemeClr val="lt1"/>
+          </a:fillRef>
+          <a:effectRef idx="0">
+            <a:schemeClr val="accent2"/>
+          </a:effectRef>
+          <a:fontRef idx="minor">
+            <a:schemeClr val="dk1"/>
+          </a:fontRef>
+        </p:style>
+        <p:txBody>
+          <a:bodyPr rtlCol="0" anchor="ctr"/>
+          <a:lstStyle/>
+          <a:p>
+            <a:pPr algn="ctr"/>
+            <a:r>
+              <a:rPr lang="en-US" dirty="0" smtClean="0"/>
+              <a:t>map</a:t>
+            </a:r>
+            <a:endParaRPr lang="en-US" dirty="0"/>
+          </a:p>
+        </p:txBody>
+      </p:sp>
+      <p:sp>
+        <p:nvSpPr>
+          <p:cNvPr id="19" name="Rounded Rectangle 18"/>
+          <p:cNvSpPr/>
+          <p:nvPr/>
+        </p:nvSpPr>
+        <p:spPr>
+          <a:xfrm>
+            <a:off x="7617746" y="1145345"/>
+            <a:ext cx="1076433" cy="777708"/>
+          </a:xfrm>
+          <a:prstGeom prst="roundRect">
+            <a:avLst/>
+          </a:prstGeom>
+          <a:noFill/>
+          <a:ln/>
+        </p:spPr>
+        <p:style>
+          <a:lnRef idx="2">
+            <a:schemeClr val="accent2"/>
+          </a:lnRef>
+          <a:fillRef idx="1">
+            <a:schemeClr val="lt1"/>
+          </a:fillRef>
+          <a:effectRef idx="0">
+            <a:schemeClr val="accent2"/>
+          </a:effectRef>
+          <a:fontRef idx="minor">
+            <a:schemeClr val="dk1"/>
+          </a:fontRef>
+        </p:style>
+        <p:txBody>
+          <a:bodyPr rtlCol="0" anchor="ctr"/>
+          <a:lstStyle/>
+          <a:p>
+            <a:pPr algn="ctr"/>
+            <a:r>
+              <a:rPr lang="en-US" dirty="0" smtClean="0"/>
+              <a:t>average</a:t>
+            </a:r>
+            <a:endParaRPr lang="en-US" dirty="0"/>
+          </a:p>
+        </p:txBody>
+      </p:sp>
+      <p:cxnSp>
+        <p:nvCxnSpPr>
+          <p:cNvPr id="20" name="Straight Arrow Connector 19"/>
+          <p:cNvCxnSpPr>
+            <a:stCxn id="6" idx="3"/>
+            <a:endCxn id="19" idx="1"/>
+          </p:cNvCxnSpPr>
+          <p:nvPr/>
+        </p:nvCxnSpPr>
+        <p:spPr>
+          <a:xfrm>
+            <a:off x="6876528" y="1527779"/>
+            <a:ext cx="741218" cy="6420"/>
+          </a:xfrm>
+          <a:prstGeom prst="straightConnector1">
+            <a:avLst/>
+          </a:prstGeom>
+          <a:ln w="44450" cap="flat" cmpd="sng" algn="ctr">
+            <a:solidFill>
+              <a:schemeClr val="accent1"/>
+            </a:solidFill>
+            <a:prstDash val="dash"/>
+            <a:round/>
+            <a:headEnd type="none" w="med" len="med"/>
+            <a:tailEnd type="arrow" w="med" len="med"/>
+          </a:ln>
+        </p:spPr>
+        <p:style>
+          <a:lnRef idx="0">
+            <a:scrgbClr r="0" g="0" b="0"/>
+          </a:lnRef>
+          <a:fillRef idx="0">
+            <a:scrgbClr r="0" g="0" b="0"/>
+          </a:fillRef>
+          <a:effectRef idx="0">
+            <a:scrgbClr r="0" g="0" b="0"/>
+          </a:effectRef>
+          <a:fontRef idx="minor">
+            <a:schemeClr val="tx1"/>
+          </a:fontRef>
+        </p:style>
+      </p:cxnSp>
+      <p:sp>
+        <p:nvSpPr>
+          <p:cNvPr id="22" name="Rectangle 21"/>
+          <p:cNvSpPr/>
+          <p:nvPr/>
+        </p:nvSpPr>
+        <p:spPr>
+          <a:xfrm>
+            <a:off x="9212793" y="1295662"/>
+            <a:ext cx="2744076" cy="464234"/>
+          </a:xfrm>
+          <a:prstGeom prst="rect">
+            <a:avLst/>
+          </a:prstGeom>
+        </p:spPr>
+        <p:style>
+          <a:lnRef idx="2">
+            <a:schemeClr val="accent4">
+              <a:shade val="50000"/>
+            </a:schemeClr>
+          </a:lnRef>
+          <a:fillRef idx="1">
+            <a:schemeClr val="accent4"/>
+          </a:fillRef>
+          <a:effectRef idx="0">
+            <a:schemeClr val="accent4"/>
+          </a:effectRef>
+          <a:fontRef idx="minor">
+            <a:schemeClr val="lt1"/>
+          </a:fontRef>
+        </p:style>
+        <p:txBody>
+          <a:bodyPr rtlCol="0" anchor="ctr"/>
+          <a:lstStyle/>
+          <a:p>
+            <a:pPr algn="ctr"/>
+            <a:r>
+              <a:rPr lang="es-ES" dirty="0" smtClean="0"/>
+              <a:t>ORD </a:t>
+            </a:r>
+            <a:r>
+              <a:rPr lang="es-ES" dirty="0" smtClean="0"/>
+              <a:t>RD </a:t>
+            </a:r>
+            <a:r>
+              <a:rPr lang="es-ES" dirty="0" err="1" smtClean="0"/>
+              <a:t>count</a:t>
+            </a:r>
+            <a:r>
+              <a:rPr lang="es-ES" dirty="0" smtClean="0"/>
+              <a:t> sum </a:t>
+            </a:r>
+            <a:r>
+              <a:rPr lang="es-ES" dirty="0" err="1" smtClean="0"/>
+              <a:t>average</a:t>
+            </a:r>
+            <a:endParaRPr lang="en-US" dirty="0"/>
+          </a:p>
+        </p:txBody>
+      </p:sp>
+      <p:cxnSp>
+        <p:nvCxnSpPr>
+          <p:cNvPr id="23" name="Straight Arrow Connector 22"/>
+          <p:cNvCxnSpPr>
+            <a:stCxn id="19" idx="3"/>
+            <a:endCxn id="22" idx="1"/>
+          </p:cNvCxnSpPr>
+          <p:nvPr/>
+        </p:nvCxnSpPr>
+        <p:spPr>
+          <a:xfrm flipV="1">
+            <a:off x="8694179" y="1527779"/>
+            <a:ext cx="518614" cy="6420"/>
+          </a:xfrm>
+          <a:prstGeom prst="straightConnector1">
+            <a:avLst/>
+          </a:prstGeom>
+          <a:ln w="44450" cap="flat" cmpd="sng" algn="ctr">
+            <a:solidFill>
+              <a:schemeClr val="accent1"/>
+            </a:solidFill>
+            <a:prstDash val="dash"/>
+            <a:round/>
+            <a:headEnd type="none" w="med" len="med"/>
+            <a:tailEnd type="arrow" w="med" len="med"/>
+          </a:ln>
+        </p:spPr>
+        <p:style>
+          <a:lnRef idx="0">
+            <a:scrgbClr r="0" g="0" b="0"/>
+          </a:lnRef>
+          <a:fillRef idx="0">
+            <a:scrgbClr r="0" g="0" b="0"/>
+          </a:fillRef>
+          <a:effectRef idx="0">
+            <a:scrgbClr r="0" g="0" b="0"/>
+          </a:effectRef>
+          <a:fontRef idx="minor">
+            <a:schemeClr val="tx1"/>
+          </a:fontRef>
+        </p:style>
+      </p:cxnSp>
+      <p:sp>
+        <p:nvSpPr>
+          <p:cNvPr id="26" name="Rounded Rectangle 25"/>
+          <p:cNvSpPr/>
+          <p:nvPr/>
+        </p:nvSpPr>
+        <p:spPr>
+          <a:xfrm>
+            <a:off x="1168128" y="2885402"/>
+            <a:ext cx="1269607" cy="777708"/>
+          </a:xfrm>
+          <a:prstGeom prst="roundRect">
+            <a:avLst/>
+          </a:prstGeom>
+          <a:noFill/>
+          <a:ln/>
+        </p:spPr>
+        <p:style>
+          <a:lnRef idx="2">
+            <a:schemeClr val="accent2"/>
+          </a:lnRef>
+          <a:fillRef idx="1">
+            <a:schemeClr val="lt1"/>
+          </a:fillRef>
+          <a:effectRef idx="0">
+            <a:schemeClr val="accent2"/>
+          </a:effectRef>
+          <a:fontRef idx="minor">
+            <a:schemeClr val="dk1"/>
+          </a:fontRef>
+        </p:style>
+        <p:txBody>
+          <a:bodyPr rtlCol="0" anchor="ctr"/>
+          <a:lstStyle/>
+          <a:p>
+            <a:pPr algn="ctr"/>
+            <a:r>
+              <a:rPr lang="en-US" dirty="0" smtClean="0"/>
+              <a:t>aggregate</a:t>
+            </a:r>
+            <a:endParaRPr lang="en-US" dirty="0"/>
+          </a:p>
+        </p:txBody>
+      </p:sp>
+      <p:sp>
+        <p:nvSpPr>
+          <p:cNvPr id="27" name="Rectangle 26"/>
+          <p:cNvSpPr/>
+          <p:nvPr/>
+        </p:nvSpPr>
+        <p:spPr>
+          <a:xfrm>
+            <a:off x="3076752" y="2577905"/>
+            <a:ext cx="762400" cy="1801418"/>
+          </a:xfrm>
+          <a:prstGeom prst="rect">
+            <a:avLst/>
+          </a:prstGeom>
+        </p:spPr>
+        <p:style>
+          <a:lnRef idx="2">
+            <a:schemeClr val="accent4">
+              <a:shade val="50000"/>
+            </a:schemeClr>
+          </a:lnRef>
+          <a:fillRef idx="1">
+            <a:schemeClr val="accent4"/>
+          </a:fillRef>
+          <a:effectRef idx="0">
+            <a:schemeClr val="accent4"/>
+          </a:effectRef>
+          <a:fontRef idx="minor">
+            <a:schemeClr val="lt1"/>
+          </a:fontRef>
+        </p:style>
+        <p:txBody>
+          <a:bodyPr rtlCol="0" anchor="ctr"/>
+          <a:lstStyle/>
+          <a:p>
+            <a:pPr algn="ctr"/>
+            <a:r>
+              <a:rPr lang="es-ES" dirty="0" smtClean="0"/>
+              <a:t>ORD</a:t>
+            </a:r>
+            <a:endParaRPr lang="en-US" dirty="0"/>
+          </a:p>
+        </p:txBody>
+      </p:sp>
+      <p:sp>
+        <p:nvSpPr>
+          <p:cNvPr id="28" name="Rectangle 27"/>
+          <p:cNvSpPr/>
+          <p:nvPr/>
+        </p:nvSpPr>
+        <p:spPr>
+          <a:xfrm>
+            <a:off x="3839152" y="2577905"/>
+            <a:ext cx="1425180" cy="464234"/>
+          </a:xfrm>
+          <a:prstGeom prst="rect">
+            <a:avLst/>
+          </a:prstGeom>
+        </p:spPr>
+        <p:style>
+          <a:lnRef idx="2">
+            <a:schemeClr val="accent4">
+              <a:shade val="50000"/>
+            </a:schemeClr>
+          </a:lnRef>
+          <a:fillRef idx="1">
+            <a:schemeClr val="accent4"/>
+          </a:fillRef>
+          <a:effectRef idx="0">
+            <a:schemeClr val="accent4"/>
+          </a:effectRef>
+          <a:fontRef idx="minor">
+            <a:schemeClr val="lt1"/>
+          </a:fontRef>
+        </p:style>
+        <p:txBody>
+          <a:bodyPr rtlCol="0" anchor="ctr"/>
+          <a:lstStyle/>
+          <a:p>
+            <a:pPr algn="ctr"/>
+            <a:r>
+              <a:rPr lang="es-ES" dirty="0" smtClean="0"/>
+              <a:t>RD -1.25</a:t>
+            </a:r>
+            <a:endParaRPr lang="en-US" dirty="0"/>
+          </a:p>
+        </p:txBody>
+      </p:sp>
+      <p:sp>
+        <p:nvSpPr>
+          <p:cNvPr id="29" name="Rectangle 28"/>
+          <p:cNvSpPr/>
+          <p:nvPr/>
+        </p:nvSpPr>
+        <p:spPr>
+          <a:xfrm>
+            <a:off x="3839152" y="3042139"/>
+            <a:ext cx="1425180" cy="464234"/>
+          </a:xfrm>
+          <a:prstGeom prst="rect">
+            <a:avLst/>
+          </a:prstGeom>
+        </p:spPr>
+        <p:style>
+          <a:lnRef idx="2">
+            <a:schemeClr val="accent4">
+              <a:shade val="50000"/>
+            </a:schemeClr>
+          </a:lnRef>
+          <a:fillRef idx="1">
+            <a:schemeClr val="accent4"/>
+          </a:fillRef>
+          <a:effectRef idx="0">
+            <a:schemeClr val="accent4"/>
+          </a:effectRef>
+          <a:fontRef idx="minor">
+            <a:schemeClr val="lt1"/>
+          </a:fontRef>
+        </p:style>
+        <p:txBody>
+          <a:bodyPr rtlCol="0" anchor="ctr"/>
+          <a:lstStyle/>
+          <a:p>
+            <a:pPr algn="ctr"/>
+            <a:r>
+              <a:rPr lang="es-ES" dirty="0" smtClean="0"/>
+              <a:t>MS -1.1</a:t>
+            </a:r>
+            <a:endParaRPr lang="en-US" dirty="0"/>
+          </a:p>
+        </p:txBody>
+      </p:sp>
+      <p:sp>
+        <p:nvSpPr>
+          <p:cNvPr id="30" name="Rectangle 29"/>
+          <p:cNvSpPr/>
+          <p:nvPr/>
+        </p:nvSpPr>
+        <p:spPr>
+          <a:xfrm>
+            <a:off x="3839152" y="3506373"/>
+            <a:ext cx="1425180" cy="464234"/>
+          </a:xfrm>
+          <a:prstGeom prst="rect">
+            <a:avLst/>
+          </a:prstGeom>
+        </p:spPr>
+        <p:style>
+          <a:lnRef idx="2">
+            <a:schemeClr val="accent4">
+              <a:shade val="50000"/>
+            </a:schemeClr>
+          </a:lnRef>
+          <a:fillRef idx="1">
+            <a:schemeClr val="accent4"/>
+          </a:fillRef>
+          <a:effectRef idx="0">
+            <a:schemeClr val="accent4"/>
+          </a:effectRef>
+          <a:fontRef idx="minor">
+            <a:schemeClr val="lt1"/>
+          </a:fontRef>
+        </p:style>
+        <p:txBody>
+          <a:bodyPr rtlCol="0" anchor="ctr"/>
+          <a:lstStyle/>
+          <a:p>
+            <a:pPr algn="ctr"/>
+            <a:r>
+              <a:rPr lang="es-ES" dirty="0" smtClean="0"/>
+              <a:t>CJ 1.243</a:t>
+            </a:r>
+            <a:endParaRPr lang="en-US" dirty="0"/>
+          </a:p>
+        </p:txBody>
+      </p:sp>
+      <p:sp>
+        <p:nvSpPr>
+          <p:cNvPr id="31" name="Rectangle 30"/>
+          <p:cNvSpPr/>
+          <p:nvPr/>
+        </p:nvSpPr>
+        <p:spPr>
+          <a:xfrm>
+            <a:off x="3830724" y="3915089"/>
+            <a:ext cx="1433608" cy="464234"/>
+          </a:xfrm>
+          <a:prstGeom prst="rect">
+            <a:avLst/>
+          </a:prstGeom>
+        </p:spPr>
+        <p:style>
+          <a:lnRef idx="2">
+            <a:schemeClr val="accent4">
+              <a:shade val="50000"/>
+            </a:schemeClr>
+          </a:lnRef>
+          <a:fillRef idx="1">
+            <a:schemeClr val="accent4"/>
+          </a:fillRef>
+          <a:effectRef idx="0">
+            <a:schemeClr val="accent4"/>
+          </a:effectRef>
+          <a:fontRef idx="minor">
+            <a:schemeClr val="lt1"/>
+          </a:fontRef>
+        </p:style>
+        <p:txBody>
+          <a:bodyPr rtlCol="0" anchor="ctr"/>
+          <a:lstStyle/>
+          <a:p>
+            <a:pPr algn="ctr"/>
+            <a:r>
+              <a:rPr lang="es-ES" dirty="0" smtClean="0"/>
+              <a:t>MS 2.25</a:t>
+            </a:r>
+            <a:endParaRPr lang="en-US" dirty="0"/>
+          </a:p>
+        </p:txBody>
+      </p:sp>
+      <p:cxnSp>
+        <p:nvCxnSpPr>
+          <p:cNvPr id="32" name="Straight Arrow Connector 31"/>
+          <p:cNvCxnSpPr>
+            <a:stCxn id="22" idx="2"/>
+            <a:endCxn id="26" idx="1"/>
+          </p:cNvCxnSpPr>
+          <p:nvPr/>
+        </p:nvCxnSpPr>
+        <p:spPr>
+          <a:xfrm rot="5400000">
+            <a:off x="5119300" y="-2191275"/>
+            <a:ext cx="1514360" cy="9416703"/>
+          </a:xfrm>
+          <a:prstGeom prst="bentConnector4">
+            <a:avLst>
+              <a:gd name="adj1" fmla="val 35436"/>
+              <a:gd name="adj2" fmla="val 106312"/>
+            </a:avLst>
+          </a:prstGeom>
+          <a:ln w="44450" cap="flat" cmpd="sng" algn="ctr">
+            <a:solidFill>
+              <a:schemeClr val="accent1"/>
+            </a:solidFill>
+            <a:prstDash val="dash"/>
+            <a:round/>
+            <a:headEnd type="none" w="med" len="med"/>
+            <a:tailEnd type="arrow" w="med" len="med"/>
+          </a:ln>
+        </p:spPr>
+        <p:style>
+          <a:lnRef idx="0">
+            <a:scrgbClr r="0" g="0" b="0"/>
+          </a:lnRef>
+          <a:fillRef idx="0">
+            <a:scrgbClr r="0" g="0" b="0"/>
+          </a:fillRef>
+          <a:effectRef idx="0">
+            <a:scrgbClr r="0" g="0" b="0"/>
+          </a:effectRef>
+          <a:fontRef idx="minor">
+            <a:schemeClr val="tx1"/>
+          </a:fontRef>
+        </p:style>
+      </p:cxnSp>
+      <p:cxnSp>
+        <p:nvCxnSpPr>
+          <p:cNvPr id="38" name="Straight Arrow Connector 37"/>
+          <p:cNvCxnSpPr>
+            <a:stCxn id="26" idx="3"/>
+          </p:cNvCxnSpPr>
+          <p:nvPr/>
+        </p:nvCxnSpPr>
+        <p:spPr>
+          <a:xfrm>
+            <a:off x="2437735" y="3274256"/>
+            <a:ext cx="660199" cy="0"/>
+          </a:xfrm>
+          <a:prstGeom prst="straightConnector1">
+            <a:avLst/>
+          </a:prstGeom>
+          <a:ln w="44450" cap="flat" cmpd="sng" algn="ctr">
+            <a:solidFill>
+              <a:schemeClr val="accent1"/>
+            </a:solidFill>
+            <a:prstDash val="dash"/>
+            <a:round/>
+            <a:headEnd type="none" w="med" len="med"/>
+            <a:tailEnd type="arrow" w="med" len="med"/>
+          </a:ln>
+        </p:spPr>
+        <p:style>
+          <a:lnRef idx="0">
+            <a:scrgbClr r="0" g="0" b="0"/>
+          </a:lnRef>
+          <a:fillRef idx="0">
+            <a:scrgbClr r="0" g="0" b="0"/>
+          </a:fillRef>
+          <a:effectRef idx="0">
+            <a:scrgbClr r="0" g="0" b="0"/>
+          </a:effectRef>
+          <a:fontRef idx="minor">
+            <a:schemeClr val="tx1"/>
+          </a:fontRef>
+        </p:style>
+      </p:cxnSp>
+      <p:sp>
+        <p:nvSpPr>
+          <p:cNvPr id="41" name="Rounded Rectangle 40"/>
+          <p:cNvSpPr/>
+          <p:nvPr/>
+        </p:nvSpPr>
+        <p:spPr>
+          <a:xfrm>
+            <a:off x="5876480" y="2882398"/>
+            <a:ext cx="1269607" cy="777708"/>
+          </a:xfrm>
+          <a:prstGeom prst="roundRect">
+            <a:avLst/>
+          </a:prstGeom>
+          <a:noFill/>
+          <a:ln/>
+        </p:spPr>
+        <p:style>
+          <a:lnRef idx="2">
+            <a:schemeClr val="accent2"/>
+          </a:lnRef>
+          <a:fillRef idx="1">
+            <a:schemeClr val="lt1"/>
+          </a:fillRef>
+          <a:effectRef idx="0">
+            <a:schemeClr val="accent2"/>
+          </a:effectRef>
+          <a:fontRef idx="minor">
+            <a:schemeClr val="dk1"/>
+          </a:fontRef>
+        </p:style>
+        <p:txBody>
+          <a:bodyPr rtlCol="0" anchor="ctr"/>
+          <a:lstStyle/>
+          <a:p>
+            <a:pPr algn="ctr"/>
+            <a:r>
+              <a:rPr lang="en-US" dirty="0" smtClean="0"/>
+              <a:t>filter</a:t>
+            </a:r>
+            <a:endParaRPr lang="en-US" dirty="0"/>
+          </a:p>
+        </p:txBody>
+      </p:sp>
+      <p:cxnSp>
+        <p:nvCxnSpPr>
+          <p:cNvPr id="42" name="Straight Arrow Connector 41"/>
+          <p:cNvCxnSpPr>
+            <a:stCxn id="29" idx="3"/>
+            <a:endCxn id="41" idx="1"/>
+          </p:cNvCxnSpPr>
+          <p:nvPr/>
+        </p:nvCxnSpPr>
+        <p:spPr>
+          <a:xfrm flipV="1">
+            <a:off x="5264332" y="3271252"/>
+            <a:ext cx="612148" cy="3004"/>
+          </a:xfrm>
+          <a:prstGeom prst="straightConnector1">
+            <a:avLst/>
+          </a:prstGeom>
+          <a:ln w="44450" cap="flat" cmpd="sng" algn="ctr">
+            <a:solidFill>
+              <a:schemeClr val="accent1"/>
+            </a:solidFill>
+            <a:prstDash val="dash"/>
+            <a:round/>
+            <a:headEnd type="none" w="med" len="med"/>
+            <a:tailEnd type="arrow" w="med" len="med"/>
+          </a:ln>
+        </p:spPr>
+        <p:style>
+          <a:lnRef idx="0">
+            <a:scrgbClr r="0" g="0" b="0"/>
+          </a:lnRef>
+          <a:fillRef idx="0">
+            <a:scrgbClr r="0" g="0" b="0"/>
+          </a:fillRef>
+          <a:effectRef idx="0">
+            <a:scrgbClr r="0" g="0" b="0"/>
+          </a:effectRef>
+          <a:fontRef idx="minor">
+            <a:schemeClr val="tx1"/>
+          </a:fontRef>
+        </p:style>
+      </p:cxnSp>
+      <p:sp>
+        <p:nvSpPr>
+          <p:cNvPr id="45" name="Can 44"/>
+          <p:cNvSpPr/>
+          <p:nvPr/>
+        </p:nvSpPr>
+        <p:spPr>
+          <a:xfrm rot="16200000">
+            <a:off x="8779215" y="1873207"/>
+            <a:ext cx="436098" cy="2751853"/>
+          </a:xfrm>
+          <a:prstGeom prst="can">
+            <a:avLst/>
+          </a:prstGeom>
+        </p:spPr>
+        <p:style>
+          <a:lnRef idx="2">
+            <a:schemeClr val="accent1">
+              <a:shade val="50000"/>
+            </a:schemeClr>
+          </a:lnRef>
+          <a:fillRef idx="1">
+            <a:schemeClr val="accent1"/>
+          </a:fillRef>
+          <a:effectRef idx="0">
+            <a:schemeClr val="accent1"/>
+          </a:effectRef>
+          <a:fontRef idx="minor">
+            <a:schemeClr val="lt1"/>
+          </a:fontRef>
+        </p:style>
+        <p:txBody>
+          <a:bodyPr rtlCol="0" anchor="ctr"/>
+          <a:lstStyle/>
+          <a:p>
+            <a:pPr algn="ctr"/>
+            <a:endParaRPr lang="en-US" dirty="0"/>
+          </a:p>
+        </p:txBody>
+      </p:sp>
+      <p:sp>
+        <p:nvSpPr>
+          <p:cNvPr id="47" name="TextBox 46"/>
+          <p:cNvSpPr txBox="1"/>
+          <p:nvPr/>
+        </p:nvSpPr>
+        <p:spPr>
+          <a:xfrm>
+            <a:off x="7846857" y="3042139"/>
+            <a:ext cx="2526333" cy="369332"/>
+          </a:xfrm>
+          <a:prstGeom prst="rect">
+            <a:avLst/>
+          </a:prstGeom>
+          <a:noFill/>
+        </p:spPr>
+        <p:txBody>
+          <a:bodyPr wrap="none" rtlCol="0">
+            <a:spAutoFit/>
+          </a:bodyPr>
+          <a:lstStyle/>
+          <a:p>
+            <a:r>
+              <a:rPr lang="en-US" dirty="0" err="1"/>
+              <a:t>t</a:t>
+            </a:r>
+            <a:r>
+              <a:rPr lang="en-US" dirty="0" err="1" smtClean="0"/>
+              <a:t>op_carriers_by_airports</a:t>
+            </a:r>
+            <a:endParaRPr lang="en-US" dirty="0"/>
+          </a:p>
+        </p:txBody>
+      </p:sp>
+      <p:cxnSp>
+        <p:nvCxnSpPr>
+          <p:cNvPr id="48" name="Straight Arrow Connector 47"/>
+          <p:cNvCxnSpPr>
+            <a:stCxn id="41" idx="3"/>
+            <a:endCxn id="45" idx="1"/>
+          </p:cNvCxnSpPr>
+          <p:nvPr/>
+        </p:nvCxnSpPr>
+        <p:spPr>
+          <a:xfrm flipV="1">
+            <a:off x="7146087" y="3249134"/>
+            <a:ext cx="475251" cy="22118"/>
+          </a:xfrm>
+          <a:prstGeom prst="straightConnector1">
+            <a:avLst/>
+          </a:prstGeom>
+          <a:ln w="44450" cap="flat" cmpd="sng" algn="ctr">
+            <a:solidFill>
+              <a:schemeClr val="accent1"/>
+            </a:solidFill>
+            <a:prstDash val="dash"/>
+            <a:round/>
+            <a:headEnd type="none" w="med" len="med"/>
+            <a:tailEnd type="arrow" w="med" len="med"/>
+          </a:ln>
+        </p:spPr>
+        <p:style>
+          <a:lnRef idx="0">
+            <a:scrgbClr r="0" g="0" b="0"/>
+          </a:lnRef>
+          <a:fillRef idx="0">
+            <a:scrgbClr r="0" g="0" b="0"/>
+          </a:fillRef>
+          <a:effectRef idx="0">
+            <a:scrgbClr r="0" g="0" b="0"/>
+          </a:effectRef>
+          <a:fontRef idx="minor">
+            <a:schemeClr val="tx1"/>
+          </a:fontRef>
+        </p:style>
+      </p:cxnSp>
+      <p:sp>
+        <p:nvSpPr>
+          <p:cNvPr id="51" name="Rounded Rectangle 50"/>
+          <p:cNvSpPr/>
+          <p:nvPr/>
+        </p:nvSpPr>
+        <p:spPr>
+          <a:xfrm>
+            <a:off x="1168128" y="5320546"/>
+            <a:ext cx="1269607" cy="777708"/>
+          </a:xfrm>
+          <a:prstGeom prst="roundRect">
+            <a:avLst/>
+          </a:prstGeom>
+          <a:noFill/>
+          <a:ln/>
+        </p:spPr>
+        <p:style>
+          <a:lnRef idx="2">
+            <a:schemeClr val="accent2"/>
+          </a:lnRef>
+          <a:fillRef idx="1">
+            <a:schemeClr val="lt1"/>
+          </a:fillRef>
+          <a:effectRef idx="0">
+            <a:schemeClr val="accent2"/>
+          </a:effectRef>
+          <a:fontRef idx="minor">
+            <a:schemeClr val="dk1"/>
+          </a:fontRef>
+        </p:style>
+        <p:txBody>
+          <a:bodyPr rtlCol="0" anchor="ctr"/>
+          <a:lstStyle/>
+          <a:p>
+            <a:pPr algn="ctr"/>
+            <a:r>
+              <a:rPr lang="en-US" dirty="0" smtClean="0"/>
+              <a:t>save</a:t>
+            </a:r>
+            <a:endParaRPr lang="en-US" dirty="0"/>
+          </a:p>
+        </p:txBody>
+      </p:sp>
+      <p:pic>
+        <p:nvPicPr>
+          <p:cNvPr id="52" name="Picture 51"/>
+          <p:cNvPicPr>
+            <a:picLocks noChangeAspect="1"/>
+          </p:cNvPicPr>
+          <p:nvPr/>
+        </p:nvPicPr>
+        <p:blipFill>
+          <a:blip r:embed="rId2" cstate="print">
+            <a:extLst>
+              <a:ext uri="{28A0092B-C50C-407E-A947-70E740481C1C}">
+                <a14:useLocalDpi xmlns:a14="http://schemas.microsoft.com/office/drawing/2010/main" val="0"/>
+              </a:ext>
+            </a:extLst>
+          </a:blip>
+          <a:stretch>
+            <a:fillRect/>
+          </a:stretch>
+        </p:blipFill>
+        <p:spPr>
+          <a:xfrm>
+            <a:off x="3193966" y="5269038"/>
+            <a:ext cx="1357776" cy="910134"/>
+          </a:xfrm>
+          <a:prstGeom prst="rect">
+            <a:avLst/>
+          </a:prstGeom>
+        </p:spPr>
+      </p:pic>
+      <p:cxnSp>
+        <p:nvCxnSpPr>
+          <p:cNvPr id="53" name="Straight Arrow Connector 52"/>
+          <p:cNvCxnSpPr>
+            <a:stCxn id="47" idx="3"/>
+            <a:endCxn id="51" idx="1"/>
+          </p:cNvCxnSpPr>
+          <p:nvPr/>
+        </p:nvCxnSpPr>
+        <p:spPr>
+          <a:xfrm flipH="1">
+            <a:off x="1168128" y="3226805"/>
+            <a:ext cx="9205062" cy="2482595"/>
+          </a:xfrm>
+          <a:prstGeom prst="bentConnector5">
+            <a:avLst>
+              <a:gd name="adj1" fmla="val -2483"/>
+              <a:gd name="adj2" fmla="val 62200"/>
+              <a:gd name="adj3" fmla="val 102483"/>
+            </a:avLst>
+          </a:prstGeom>
+          <a:ln w="44450" cap="flat" cmpd="sng" algn="ctr">
+            <a:solidFill>
+              <a:schemeClr val="accent1"/>
+            </a:solidFill>
+            <a:prstDash val="dash"/>
+            <a:round/>
+            <a:headEnd type="none" w="med" len="med"/>
+            <a:tailEnd type="arrow" w="med" len="med"/>
+          </a:ln>
+        </p:spPr>
+        <p:style>
+          <a:lnRef idx="0">
+            <a:scrgbClr r="0" g="0" b="0"/>
+          </a:lnRef>
+          <a:fillRef idx="0">
+            <a:scrgbClr r="0" g="0" b="0"/>
+          </a:fillRef>
+          <a:effectRef idx="0">
+            <a:scrgbClr r="0" g="0" b="0"/>
+          </a:effectRef>
+          <a:fontRef idx="minor">
+            <a:schemeClr val="tx1"/>
+          </a:fontRef>
+        </p:style>
+      </p:cxnSp>
+      <p:cxnSp>
+        <p:nvCxnSpPr>
+          <p:cNvPr id="57" name="Straight Arrow Connector 56"/>
+          <p:cNvCxnSpPr>
+            <a:stCxn id="51" idx="3"/>
+            <a:endCxn id="52" idx="1"/>
+          </p:cNvCxnSpPr>
+          <p:nvPr/>
+        </p:nvCxnSpPr>
+        <p:spPr>
+          <a:xfrm>
+            <a:off x="2437735" y="5709400"/>
+            <a:ext cx="756231" cy="14705"/>
+          </a:xfrm>
+          <a:prstGeom prst="straightConnector1">
+            <a:avLst/>
+          </a:prstGeom>
+          <a:ln w="44450" cap="flat" cmpd="sng" algn="ctr">
+            <a:solidFill>
+              <a:schemeClr val="accent1"/>
+            </a:solidFill>
+            <a:prstDash val="dash"/>
+            <a:round/>
+            <a:headEnd type="none" w="med" len="med"/>
+            <a:tailEnd type="arrow" w="med" len="med"/>
+          </a:ln>
+        </p:spPr>
+        <p:style>
+          <a:lnRef idx="0">
+            <a:scrgbClr r="0" g="0" b="0"/>
+          </a:lnRef>
+          <a:fillRef idx="0">
+            <a:scrgbClr r="0" g="0" b="0"/>
+          </a:fillRef>
+          <a:effectRef idx="0">
+            <a:scrgbClr r="0" g="0" b="0"/>
+          </a:effectRef>
+          <a:fontRef idx="minor">
+            <a:schemeClr val="tx1"/>
+          </a:fontRef>
+        </p:style>
+      </p:cxnSp>
+    </p:spTree>
+    <p:extLst>
+      <p:ext uri="{BB962C8B-B14F-4D97-AF65-F5344CB8AC3E}">
+        <p14:creationId xmlns:p14="http://schemas.microsoft.com/office/powerpoint/2010/main" val="2134543164"/>
+      </p:ext>
+    </p:extLst>
+  </p:cSld>
+  <p:clrMapOvr>
+    <a:masterClrMapping/>
+  </p:clrMapOvr>
+</p:sld>
+</file>
+
+<file path=ppt/slides/slide6.xml><?xml version="1.0" encoding="utf-8"?>
+<p:sld xmlns:a="http://schemas.openxmlformats.org/drawingml/2006/main" xmlns:r="http://schemas.openxmlformats.org/officeDocument/2006/relationships" xmlns:p="http://schemas.openxmlformats.org/presentationml/2006/main">
+  <p:cSld>
+    <p:spTree>
+      <p:nvGrpSpPr>
+        <p:cNvPr id="1" name=""/>
+        <p:cNvGrpSpPr/>
+        <p:nvPr/>
+      </p:nvGrpSpPr>
+      <p:grpSpPr>
+        <a:xfrm>
+          <a:off x="0" y="0"/>
+          <a:ext cx="0" cy="0"/>
+          <a:chOff x="0" y="0"/>
+          <a:chExt cx="0" cy="0"/>
+        </a:xfrm>
+      </p:grpSpPr>
+      <p:sp>
+        <p:nvSpPr>
+          <p:cNvPr id="2" name="Can 1"/>
+          <p:cNvSpPr/>
+          <p:nvPr/>
+        </p:nvSpPr>
+        <p:spPr>
+          <a:xfrm rot="16200000">
+            <a:off x="1139228" y="603319"/>
+            <a:ext cx="436098" cy="1885071"/>
+          </a:xfrm>
+          <a:prstGeom prst="can">
+            <a:avLst/>
+          </a:prstGeom>
+        </p:spPr>
+        <p:style>
+          <a:lnRef idx="2">
+            <a:schemeClr val="accent1">
+              <a:shade val="50000"/>
+            </a:schemeClr>
+          </a:lnRef>
+          <a:fillRef idx="1">
+            <a:schemeClr val="accent1"/>
+          </a:fillRef>
+          <a:effectRef idx="0">
+            <a:schemeClr val="accent1"/>
+          </a:effectRef>
+          <a:fontRef idx="minor">
+            <a:schemeClr val="lt1"/>
+          </a:fontRef>
+        </p:style>
+        <p:txBody>
+          <a:bodyPr rtlCol="0" anchor="ctr"/>
+          <a:lstStyle/>
+          <a:p>
+            <a:pPr algn="ctr"/>
+            <a:endParaRPr lang="en-US" dirty="0"/>
+          </a:p>
+        </p:txBody>
+      </p:sp>
+      <p:sp>
+        <p:nvSpPr>
+          <p:cNvPr id="3" name="TextBox 2"/>
+          <p:cNvSpPr txBox="1"/>
+          <p:nvPr/>
+        </p:nvSpPr>
+        <p:spPr>
+          <a:xfrm>
+            <a:off x="1058651" y="1355954"/>
+            <a:ext cx="679994" cy="369332"/>
+          </a:xfrm>
+          <a:prstGeom prst="rect">
+            <a:avLst/>
+          </a:prstGeom>
+          <a:noFill/>
+        </p:spPr>
+        <p:txBody>
+          <a:bodyPr wrap="none" rtlCol="0">
+            <a:spAutoFit/>
+          </a:bodyPr>
+          <a:lstStyle/>
+          <a:p>
+            <a:r>
+              <a:rPr lang="en-US" dirty="0" smtClean="0"/>
+              <a:t>input</a:t>
+            </a:r>
+            <a:endParaRPr lang="en-US" dirty="0"/>
+          </a:p>
+        </p:txBody>
+      </p:sp>
+      <p:sp>
+        <p:nvSpPr>
+          <p:cNvPr id="6" name="Rectangle 5"/>
+          <p:cNvSpPr/>
+          <p:nvPr/>
+        </p:nvSpPr>
+        <p:spPr>
+          <a:xfrm>
+            <a:off x="4933444" y="1295662"/>
+            <a:ext cx="1943084" cy="464234"/>
+          </a:xfrm>
+          <a:prstGeom prst="rect">
+            <a:avLst/>
+          </a:prstGeom>
+        </p:spPr>
+        <p:style>
+          <a:lnRef idx="2">
+            <a:schemeClr val="accent4">
+              <a:shade val="50000"/>
+            </a:schemeClr>
+          </a:lnRef>
+          <a:fillRef idx="1">
+            <a:schemeClr val="accent4"/>
+          </a:fillRef>
+          <a:effectRef idx="0">
+            <a:schemeClr val="accent4"/>
+          </a:effectRef>
+          <a:fontRef idx="minor">
+            <a:schemeClr val="lt1"/>
+          </a:fontRef>
+        </p:style>
+        <p:txBody>
+          <a:bodyPr rtlCol="0" anchor="ctr"/>
+          <a:lstStyle/>
+          <a:p>
+            <a:pPr algn="ctr"/>
+            <a:r>
+              <a:rPr lang="es-ES" dirty="0" smtClean="0"/>
+              <a:t>ORD </a:t>
+            </a:r>
+            <a:r>
+              <a:rPr lang="es-ES" dirty="0" smtClean="0"/>
+              <a:t>LAX -1.2</a:t>
+            </a:r>
+            <a:endParaRPr lang="en-US" dirty="0"/>
+          </a:p>
+        </p:txBody>
+      </p:sp>
+      <p:cxnSp>
+        <p:nvCxnSpPr>
+          <p:cNvPr id="16" name="Straight Arrow Connector 15"/>
+          <p:cNvCxnSpPr>
+            <a:stCxn id="2" idx="3"/>
+            <a:endCxn id="12" idx="1"/>
+          </p:cNvCxnSpPr>
+          <p:nvPr/>
+        </p:nvCxnSpPr>
+        <p:spPr>
+          <a:xfrm flipV="1">
+            <a:off x="2299813" y="1540620"/>
+            <a:ext cx="776939" cy="5234"/>
+          </a:xfrm>
+          <a:prstGeom prst="straightConnector1">
+            <a:avLst/>
+          </a:prstGeom>
+          <a:ln w="44450" cap="flat" cmpd="sng" algn="ctr">
+            <a:solidFill>
+              <a:schemeClr val="accent1"/>
+            </a:solidFill>
+            <a:prstDash val="dash"/>
+            <a:round/>
+            <a:headEnd type="none" w="med" len="med"/>
+            <a:tailEnd type="arrow" w="med" len="med"/>
+          </a:ln>
+        </p:spPr>
+        <p:style>
+          <a:lnRef idx="0">
+            <a:scrgbClr r="0" g="0" b="0"/>
+          </a:lnRef>
+          <a:fillRef idx="0">
+            <a:scrgbClr r="0" g="0" b="0"/>
+          </a:fillRef>
+          <a:effectRef idx="0">
+            <a:scrgbClr r="0" g="0" b="0"/>
+          </a:effectRef>
+          <a:fontRef idx="minor">
+            <a:schemeClr val="tx1"/>
+          </a:fontRef>
+        </p:style>
+      </p:cxnSp>
+      <p:cxnSp>
+        <p:nvCxnSpPr>
+          <p:cNvPr id="18" name="Straight Arrow Connector 17"/>
+          <p:cNvCxnSpPr>
+            <a:stCxn id="12" idx="3"/>
+            <a:endCxn id="6" idx="1"/>
+          </p:cNvCxnSpPr>
+          <p:nvPr/>
+        </p:nvCxnSpPr>
+        <p:spPr>
+          <a:xfrm flipV="1">
+            <a:off x="4153185" y="1527779"/>
+            <a:ext cx="780259" cy="12841"/>
+          </a:xfrm>
+          <a:prstGeom prst="straightConnector1">
+            <a:avLst/>
+          </a:prstGeom>
+          <a:ln w="44450" cap="flat" cmpd="sng" algn="ctr">
+            <a:solidFill>
+              <a:schemeClr val="accent1"/>
+            </a:solidFill>
+            <a:prstDash val="dash"/>
+            <a:round/>
+            <a:headEnd type="none" w="med" len="med"/>
+            <a:tailEnd type="arrow" w="med" len="med"/>
+          </a:ln>
+        </p:spPr>
+        <p:style>
+          <a:lnRef idx="0">
+            <a:scrgbClr r="0" g="0" b="0"/>
+          </a:lnRef>
+          <a:fillRef idx="0">
+            <a:scrgbClr r="0" g="0" b="0"/>
+          </a:fillRef>
+          <a:effectRef idx="0">
+            <a:scrgbClr r="0" g="0" b="0"/>
+          </a:effectRef>
+          <a:fontRef idx="minor">
+            <a:schemeClr val="tx1"/>
+          </a:fontRef>
+        </p:style>
+      </p:cxnSp>
+      <p:sp>
+        <p:nvSpPr>
+          <p:cNvPr id="12" name="Rounded Rectangle 11"/>
+          <p:cNvSpPr/>
+          <p:nvPr/>
+        </p:nvSpPr>
+        <p:spPr>
+          <a:xfrm>
+            <a:off x="3076752" y="1151766"/>
+            <a:ext cx="1076433" cy="777708"/>
+          </a:xfrm>
+          <a:prstGeom prst="roundRect">
+            <a:avLst/>
+          </a:prstGeom>
+          <a:noFill/>
+          <a:ln/>
+        </p:spPr>
+        <p:style>
+          <a:lnRef idx="2">
+            <a:schemeClr val="accent2"/>
+          </a:lnRef>
+          <a:fillRef idx="1">
+            <a:schemeClr val="lt1"/>
+          </a:fillRef>
+          <a:effectRef idx="0">
+            <a:schemeClr val="accent2"/>
+          </a:effectRef>
+          <a:fontRef idx="minor">
+            <a:schemeClr val="dk1"/>
+          </a:fontRef>
+        </p:style>
+        <p:txBody>
+          <a:bodyPr rtlCol="0" anchor="ctr"/>
+          <a:lstStyle/>
+          <a:p>
+            <a:pPr algn="ctr"/>
+            <a:r>
+              <a:rPr lang="en-US" dirty="0" smtClean="0"/>
+              <a:t>map</a:t>
+            </a:r>
+            <a:endParaRPr lang="en-US" dirty="0"/>
+          </a:p>
+        </p:txBody>
+      </p:sp>
+      <p:sp>
+        <p:nvSpPr>
+          <p:cNvPr id="19" name="Rounded Rectangle 18"/>
+          <p:cNvSpPr/>
+          <p:nvPr/>
+        </p:nvSpPr>
+        <p:spPr>
+          <a:xfrm>
+            <a:off x="8205657" y="1145345"/>
+            <a:ext cx="1076433" cy="777708"/>
+          </a:xfrm>
+          <a:prstGeom prst="roundRect">
+            <a:avLst/>
+          </a:prstGeom>
+          <a:noFill/>
+          <a:ln/>
+        </p:spPr>
+        <p:style>
+          <a:lnRef idx="2">
+            <a:schemeClr val="accent2"/>
+          </a:lnRef>
+          <a:fillRef idx="1">
+            <a:schemeClr val="lt1"/>
+          </a:fillRef>
+          <a:effectRef idx="0">
+            <a:schemeClr val="accent2"/>
+          </a:effectRef>
+          <a:fontRef idx="minor">
+            <a:schemeClr val="dk1"/>
+          </a:fontRef>
+        </p:style>
+        <p:txBody>
+          <a:bodyPr rtlCol="0" anchor="ctr"/>
+          <a:lstStyle/>
+          <a:p>
+            <a:pPr algn="ctr"/>
+            <a:r>
+              <a:rPr lang="en-US" dirty="0" smtClean="0"/>
+              <a:t>average</a:t>
+            </a:r>
+            <a:endParaRPr lang="en-US" dirty="0"/>
+          </a:p>
+        </p:txBody>
+      </p:sp>
+      <p:cxnSp>
+        <p:nvCxnSpPr>
+          <p:cNvPr id="20" name="Straight Arrow Connector 19"/>
+          <p:cNvCxnSpPr>
+            <a:stCxn id="6" idx="3"/>
+            <a:endCxn id="19" idx="1"/>
+          </p:cNvCxnSpPr>
+          <p:nvPr/>
+        </p:nvCxnSpPr>
+        <p:spPr>
+          <a:xfrm>
+            <a:off x="6876528" y="1527779"/>
+            <a:ext cx="1329129" cy="6420"/>
+          </a:xfrm>
+          <a:prstGeom prst="straightConnector1">
+            <a:avLst/>
+          </a:prstGeom>
+          <a:ln w="44450" cap="flat" cmpd="sng" algn="ctr">
+            <a:solidFill>
+              <a:schemeClr val="accent1"/>
+            </a:solidFill>
+            <a:prstDash val="dash"/>
+            <a:round/>
+            <a:headEnd type="none" w="med" len="med"/>
+            <a:tailEnd type="arrow" w="med" len="med"/>
+          </a:ln>
+        </p:spPr>
+        <p:style>
+          <a:lnRef idx="0">
+            <a:scrgbClr r="0" g="0" b="0"/>
+          </a:lnRef>
+          <a:fillRef idx="0">
+            <a:scrgbClr r="0" g="0" b="0"/>
+          </a:fillRef>
+          <a:effectRef idx="0">
+            <a:scrgbClr r="0" g="0" b="0"/>
+          </a:effectRef>
+          <a:fontRef idx="minor">
+            <a:schemeClr val="tx1"/>
+          </a:fontRef>
+        </p:style>
+      </p:cxnSp>
+      <p:sp>
+        <p:nvSpPr>
+          <p:cNvPr id="22" name="Rectangle 21"/>
+          <p:cNvSpPr/>
+          <p:nvPr/>
+        </p:nvSpPr>
+        <p:spPr>
+          <a:xfrm>
+            <a:off x="704206" y="3042139"/>
+            <a:ext cx="2818098" cy="464234"/>
+          </a:xfrm>
+          <a:prstGeom prst="rect">
+            <a:avLst/>
+          </a:prstGeom>
+        </p:spPr>
+        <p:style>
+          <a:lnRef idx="2">
+            <a:schemeClr val="accent4">
+              <a:shade val="50000"/>
+            </a:schemeClr>
+          </a:lnRef>
+          <a:fillRef idx="1">
+            <a:schemeClr val="accent4"/>
+          </a:fillRef>
+          <a:effectRef idx="0">
+            <a:schemeClr val="accent4"/>
+          </a:effectRef>
+          <a:fontRef idx="minor">
+            <a:schemeClr val="lt1"/>
+          </a:fontRef>
+        </p:style>
+        <p:txBody>
+          <a:bodyPr rtlCol="0" anchor="ctr"/>
+          <a:lstStyle/>
+          <a:p>
+            <a:pPr algn="ctr"/>
+            <a:r>
+              <a:rPr lang="es-ES" dirty="0" smtClean="0"/>
+              <a:t>ORD </a:t>
+            </a:r>
+            <a:r>
+              <a:rPr lang="es-ES" dirty="0" smtClean="0"/>
+              <a:t>LAX </a:t>
+            </a:r>
+            <a:r>
+              <a:rPr lang="es-ES" dirty="0" err="1" smtClean="0"/>
+              <a:t>count</a:t>
+            </a:r>
+            <a:r>
+              <a:rPr lang="es-ES" dirty="0" smtClean="0"/>
+              <a:t> sum </a:t>
+            </a:r>
+            <a:r>
+              <a:rPr lang="es-ES" dirty="0" err="1" smtClean="0"/>
+              <a:t>avg</a:t>
+            </a:r>
+            <a:endParaRPr lang="en-US" dirty="0"/>
+          </a:p>
+        </p:txBody>
+      </p:sp>
+      <p:cxnSp>
+        <p:nvCxnSpPr>
+          <p:cNvPr id="23" name="Straight Arrow Connector 22"/>
+          <p:cNvCxnSpPr>
+            <a:stCxn id="19" idx="3"/>
+            <a:endCxn id="22" idx="0"/>
+          </p:cNvCxnSpPr>
+          <p:nvPr/>
+        </p:nvCxnSpPr>
+        <p:spPr>
+          <a:xfrm flipH="1">
+            <a:off x="2113255" y="1534199"/>
+            <a:ext cx="7168835" cy="1507940"/>
+          </a:xfrm>
+          <a:prstGeom prst="bentConnector4">
+            <a:avLst>
+              <a:gd name="adj1" fmla="val -3189"/>
+              <a:gd name="adj2" fmla="val 62894"/>
+            </a:avLst>
+          </a:prstGeom>
+          <a:ln w="44450" cap="flat" cmpd="sng" algn="ctr">
+            <a:solidFill>
+              <a:schemeClr val="accent1"/>
+            </a:solidFill>
+            <a:prstDash val="dash"/>
+            <a:round/>
+            <a:headEnd type="none" w="med" len="med"/>
+            <a:tailEnd type="arrow" w="med" len="med"/>
+          </a:ln>
+        </p:spPr>
+        <p:style>
+          <a:lnRef idx="0">
+            <a:scrgbClr r="0" g="0" b="0"/>
+          </a:lnRef>
+          <a:fillRef idx="0">
+            <a:scrgbClr r="0" g="0" b="0"/>
+          </a:fillRef>
+          <a:effectRef idx="0">
+            <a:scrgbClr r="0" g="0" b="0"/>
+          </a:effectRef>
+          <a:fontRef idx="minor">
+            <a:schemeClr val="tx1"/>
+          </a:fontRef>
+        </p:style>
+      </p:cxnSp>
+      <p:cxnSp>
+        <p:nvCxnSpPr>
+          <p:cNvPr id="32" name="Straight Arrow Connector 31"/>
+          <p:cNvCxnSpPr>
+            <a:stCxn id="22" idx="3"/>
+            <a:endCxn id="41" idx="1"/>
+          </p:cNvCxnSpPr>
+          <p:nvPr/>
+        </p:nvCxnSpPr>
+        <p:spPr>
+          <a:xfrm flipV="1">
+            <a:off x="3522304" y="3271252"/>
+            <a:ext cx="1409049" cy="3004"/>
+          </a:xfrm>
+          <a:prstGeom prst="bentConnector3">
+            <a:avLst>
+              <a:gd name="adj1" fmla="val 50000"/>
+            </a:avLst>
+          </a:prstGeom>
+          <a:ln w="44450" cap="flat" cmpd="sng" algn="ctr">
+            <a:solidFill>
+              <a:schemeClr val="accent1"/>
+            </a:solidFill>
+            <a:prstDash val="dash"/>
+            <a:round/>
+            <a:headEnd type="none" w="med" len="med"/>
+            <a:tailEnd type="arrow" w="med" len="med"/>
+          </a:ln>
+        </p:spPr>
+        <p:style>
+          <a:lnRef idx="0">
+            <a:scrgbClr r="0" g="0" b="0"/>
+          </a:lnRef>
+          <a:fillRef idx="0">
+            <a:scrgbClr r="0" g="0" b="0"/>
+          </a:fillRef>
+          <a:effectRef idx="0">
+            <a:scrgbClr r="0" g="0" b="0"/>
+          </a:effectRef>
+          <a:fontRef idx="minor">
+            <a:schemeClr val="tx1"/>
+          </a:fontRef>
+        </p:style>
+      </p:cxnSp>
+      <p:sp>
+        <p:nvSpPr>
+          <p:cNvPr id="41" name="Rounded Rectangle 40"/>
+          <p:cNvSpPr/>
+          <p:nvPr/>
+        </p:nvSpPr>
+        <p:spPr>
+          <a:xfrm>
+            <a:off x="4931353" y="2882398"/>
+            <a:ext cx="1269607" cy="777708"/>
+          </a:xfrm>
+          <a:prstGeom prst="roundRect">
+            <a:avLst/>
+          </a:prstGeom>
+          <a:noFill/>
+          <a:ln/>
+        </p:spPr>
+        <p:style>
+          <a:lnRef idx="2">
+            <a:schemeClr val="accent2"/>
+          </a:lnRef>
+          <a:fillRef idx="1">
+            <a:schemeClr val="lt1"/>
+          </a:fillRef>
+          <a:effectRef idx="0">
+            <a:schemeClr val="accent2"/>
+          </a:effectRef>
+          <a:fontRef idx="minor">
+            <a:schemeClr val="dk1"/>
+          </a:fontRef>
+        </p:style>
+        <p:txBody>
+          <a:bodyPr rtlCol="0" anchor="ctr"/>
+          <a:lstStyle/>
+          <a:p>
+            <a:pPr algn="ctr"/>
+            <a:r>
+              <a:rPr lang="en-US" dirty="0" smtClean="0"/>
+              <a:t>filter</a:t>
+            </a:r>
+            <a:endParaRPr lang="en-US" dirty="0"/>
+          </a:p>
+        </p:txBody>
+      </p:sp>
+      <p:sp>
+        <p:nvSpPr>
+          <p:cNvPr id="45" name="Can 44"/>
+          <p:cNvSpPr/>
+          <p:nvPr/>
+        </p:nvSpPr>
+        <p:spPr>
+          <a:xfrm rot="16200000">
+            <a:off x="8418541" y="1912397"/>
+            <a:ext cx="436098" cy="2751853"/>
+          </a:xfrm>
+          <a:prstGeom prst="can">
+            <a:avLst/>
+          </a:prstGeom>
+        </p:spPr>
+        <p:style>
+          <a:lnRef idx="2">
+            <a:schemeClr val="accent1">
+              <a:shade val="50000"/>
+            </a:schemeClr>
+          </a:lnRef>
+          <a:fillRef idx="1">
+            <a:schemeClr val="accent1"/>
+          </a:fillRef>
+          <a:effectRef idx="0">
+            <a:schemeClr val="accent1"/>
+          </a:effectRef>
+          <a:fontRef idx="minor">
+            <a:schemeClr val="lt1"/>
+          </a:fontRef>
+        </p:style>
+        <p:txBody>
+          <a:bodyPr rtlCol="0" anchor="ctr"/>
+          <a:lstStyle/>
+          <a:p>
+            <a:pPr algn="ctr"/>
+            <a:endParaRPr lang="en-US" dirty="0"/>
+          </a:p>
+        </p:txBody>
+      </p:sp>
+      <p:sp>
+        <p:nvSpPr>
+          <p:cNvPr id="47" name="TextBox 46"/>
+          <p:cNvSpPr txBox="1"/>
+          <p:nvPr/>
+        </p:nvSpPr>
+        <p:spPr>
+          <a:xfrm>
+            <a:off x="7450108" y="3095122"/>
+            <a:ext cx="2526333" cy="369332"/>
+          </a:xfrm>
+          <a:prstGeom prst="rect">
+            <a:avLst/>
+          </a:prstGeom>
+          <a:noFill/>
+        </p:spPr>
+        <p:txBody>
+          <a:bodyPr wrap="none" rtlCol="0">
+            <a:spAutoFit/>
+          </a:bodyPr>
+          <a:lstStyle/>
+          <a:p>
+            <a:r>
+              <a:rPr lang="en-US" dirty="0" err="1"/>
+              <a:t>airports_airports_arrival</a:t>
+            </a:r>
+            <a:endParaRPr lang="en-US" dirty="0"/>
+          </a:p>
+        </p:txBody>
+      </p:sp>
+      <p:cxnSp>
+        <p:nvCxnSpPr>
+          <p:cNvPr id="48" name="Straight Arrow Connector 47"/>
+          <p:cNvCxnSpPr>
+            <a:stCxn id="41" idx="3"/>
+            <a:endCxn id="45" idx="1"/>
+          </p:cNvCxnSpPr>
+          <p:nvPr/>
+        </p:nvCxnSpPr>
+        <p:spPr>
+          <a:xfrm>
+            <a:off x="6200960" y="3271252"/>
+            <a:ext cx="1059704" cy="17072"/>
+          </a:xfrm>
+          <a:prstGeom prst="straightConnector1">
+            <a:avLst/>
+          </a:prstGeom>
+          <a:ln w="44450" cap="flat" cmpd="sng" algn="ctr">
+            <a:solidFill>
+              <a:schemeClr val="accent1"/>
+            </a:solidFill>
+            <a:prstDash val="dash"/>
+            <a:round/>
+            <a:headEnd type="none" w="med" len="med"/>
+            <a:tailEnd type="arrow" w="med" len="med"/>
+          </a:ln>
+        </p:spPr>
+        <p:style>
+          <a:lnRef idx="0">
+            <a:scrgbClr r="0" g="0" b="0"/>
+          </a:lnRef>
+          <a:fillRef idx="0">
+            <a:scrgbClr r="0" g="0" b="0"/>
+          </a:fillRef>
+          <a:effectRef idx="0">
+            <a:scrgbClr r="0" g="0" b="0"/>
+          </a:effectRef>
+          <a:fontRef idx="minor">
+            <a:schemeClr val="tx1"/>
+          </a:fontRef>
+        </p:style>
+      </p:cxnSp>
+      <p:sp>
+        <p:nvSpPr>
+          <p:cNvPr id="51" name="Rounded Rectangle 50"/>
+          <p:cNvSpPr/>
+          <p:nvPr/>
+        </p:nvSpPr>
+        <p:spPr>
+          <a:xfrm>
+            <a:off x="2801355" y="4538424"/>
+            <a:ext cx="1269607" cy="777708"/>
+          </a:xfrm>
+          <a:prstGeom prst="roundRect">
+            <a:avLst/>
+          </a:prstGeom>
+          <a:noFill/>
+          <a:ln/>
+        </p:spPr>
+        <p:style>
+          <a:lnRef idx="2">
+            <a:schemeClr val="accent2"/>
+          </a:lnRef>
+          <a:fillRef idx="1">
+            <a:schemeClr val="lt1"/>
+          </a:fillRef>
+          <a:effectRef idx="0">
+            <a:schemeClr val="accent2"/>
+          </a:effectRef>
+          <a:fontRef idx="minor">
+            <a:schemeClr val="dk1"/>
+          </a:fontRef>
+        </p:style>
+        <p:txBody>
+          <a:bodyPr rtlCol="0" anchor="ctr"/>
+          <a:lstStyle/>
+          <a:p>
+            <a:pPr algn="ctr"/>
+            <a:r>
+              <a:rPr lang="en-US" dirty="0" smtClean="0"/>
+              <a:t>save</a:t>
+            </a:r>
+            <a:endParaRPr lang="en-US" dirty="0"/>
+          </a:p>
+        </p:txBody>
+      </p:sp>
+      <p:pic>
+        <p:nvPicPr>
+          <p:cNvPr id="52" name="Picture 51"/>
+          <p:cNvPicPr>
+            <a:picLocks noChangeAspect="1"/>
+          </p:cNvPicPr>
+          <p:nvPr/>
+        </p:nvPicPr>
+        <p:blipFill>
+          <a:blip r:embed="rId2" cstate="print">
+            <a:extLst>
+              <a:ext uri="{28A0092B-C50C-407E-A947-70E740481C1C}">
+                <a14:useLocalDpi xmlns:a14="http://schemas.microsoft.com/office/drawing/2010/main" val="0"/>
+              </a:ext>
+            </a:extLst>
+          </a:blip>
+          <a:stretch>
+            <a:fillRect/>
+          </a:stretch>
+        </p:blipFill>
+        <p:spPr>
+          <a:xfrm>
+            <a:off x="4827193" y="4486916"/>
+            <a:ext cx="1357776" cy="910134"/>
+          </a:xfrm>
+          <a:prstGeom prst="rect">
+            <a:avLst/>
+          </a:prstGeom>
+        </p:spPr>
+      </p:pic>
+      <p:cxnSp>
+        <p:nvCxnSpPr>
+          <p:cNvPr id="53" name="Straight Arrow Connector 52"/>
+          <p:cNvCxnSpPr>
+            <a:stCxn id="47" idx="3"/>
+            <a:endCxn id="51" idx="1"/>
+          </p:cNvCxnSpPr>
+          <p:nvPr/>
+        </p:nvCxnSpPr>
+        <p:spPr>
+          <a:xfrm flipH="1">
+            <a:off x="2801355" y="3279788"/>
+            <a:ext cx="7175086" cy="1647490"/>
+          </a:xfrm>
+          <a:prstGeom prst="bentConnector5">
+            <a:avLst>
+              <a:gd name="adj1" fmla="val -3186"/>
+              <a:gd name="adj2" fmla="val 43803"/>
+              <a:gd name="adj3" fmla="val 103186"/>
+            </a:avLst>
+          </a:prstGeom>
+          <a:ln w="44450" cap="flat" cmpd="sng" algn="ctr">
+            <a:solidFill>
+              <a:schemeClr val="accent1"/>
+            </a:solidFill>
+            <a:prstDash val="dash"/>
+            <a:round/>
+            <a:headEnd type="none" w="med" len="med"/>
+            <a:tailEnd type="arrow" w="med" len="med"/>
+          </a:ln>
+        </p:spPr>
+        <p:style>
+          <a:lnRef idx="0">
+            <a:scrgbClr r="0" g="0" b="0"/>
+          </a:lnRef>
+          <a:fillRef idx="0">
+            <a:scrgbClr r="0" g="0" b="0"/>
+          </a:fillRef>
+          <a:effectRef idx="0">
+            <a:scrgbClr r="0" g="0" b="0"/>
+          </a:effectRef>
+          <a:fontRef idx="minor">
+            <a:schemeClr val="tx1"/>
+          </a:fontRef>
+        </p:style>
+      </p:cxnSp>
+      <p:cxnSp>
+        <p:nvCxnSpPr>
+          <p:cNvPr id="57" name="Straight Arrow Connector 56"/>
+          <p:cNvCxnSpPr>
+            <a:stCxn id="51" idx="3"/>
+            <a:endCxn id="52" idx="1"/>
+          </p:cNvCxnSpPr>
+          <p:nvPr/>
+        </p:nvCxnSpPr>
+        <p:spPr>
+          <a:xfrm>
+            <a:off x="4070962" y="4927278"/>
+            <a:ext cx="756231" cy="14705"/>
+          </a:xfrm>
+          <a:prstGeom prst="straightConnector1">
+            <a:avLst/>
+          </a:prstGeom>
+          <a:ln w="44450" cap="flat" cmpd="sng" algn="ctr">
+            <a:solidFill>
+              <a:schemeClr val="accent1"/>
+            </a:solidFill>
+            <a:prstDash val="dash"/>
+            <a:round/>
+            <a:headEnd type="none" w="med" len="med"/>
+            <a:tailEnd type="arrow" w="med" len="med"/>
+          </a:ln>
+        </p:spPr>
+        <p:style>
+          <a:lnRef idx="0">
+            <a:scrgbClr r="0" g="0" b="0"/>
+          </a:lnRef>
+          <a:fillRef idx="0">
+            <a:scrgbClr r="0" g="0" b="0"/>
+          </a:fillRef>
+          <a:effectRef idx="0">
+            <a:scrgbClr r="0" g="0" b="0"/>
+          </a:effectRef>
+          <a:fontRef idx="minor">
+            <a:schemeClr val="tx1"/>
+          </a:fontRef>
+        </p:style>
+      </p:cxnSp>
+    </p:spTree>
+    <p:extLst>
+      <p:ext uri="{BB962C8B-B14F-4D97-AF65-F5344CB8AC3E}">
+        <p14:creationId xmlns:p14="http://schemas.microsoft.com/office/powerpoint/2010/main" val="255024113"/>
+      </p:ext>
+    </p:extLst>
+  </p:cSld>
+  <p:clrMapOvr>
+    <a:masterClrMapping/>
+  </p:clrMapOvr>
+</p:sld>
+</file>
+
 <file path=ppt/theme/theme1.xml><?xml version="1.0" encoding="utf-8"?>
 <a:theme xmlns:a="http://schemas.openxmlformats.org/drawingml/2006/main" name="Office Theme">
   <a:themeElements>

</xml_diff>